<commit_message>
Minor slide updates, up to lecture 4.
</commit_message>
<xml_diff>
--- a/doc/advanced/slides/lesson_04.pptx
+++ b/doc/advanced/slides/lesson_04.pptx
@@ -241,7 +241,7 @@
           <a:p>
             <a:fld id="{9B5B52BA-3295-0343-9E28-A260A811DD10}" type="datetimeFigureOut">
               <a:rPr lang="en-US" smtClean="0"/>
-              <a:t>8/6/20</a:t>
+              <a:t>9/9/21</a:t>
             </a:fld>
             <a:endParaRPr lang="en-US"/>
           </a:p>
@@ -721,7 +721,7 @@
           <a:p>
             <a:fld id="{04F1D4A2-813C-F741-B481-C92B3A596030}" type="datetimeFigureOut">
               <a:rPr lang="en-US" smtClean="0"/>
-              <a:t>8/6/20</a:t>
+              <a:t>9/9/21</a:t>
             </a:fld>
             <a:endParaRPr lang="en-US"/>
           </a:p>
@@ -889,7 +889,7 @@
           <a:p>
             <a:fld id="{04F1D4A2-813C-F741-B481-C92B3A596030}" type="datetimeFigureOut">
               <a:rPr lang="en-US" smtClean="0"/>
-              <a:t>8/6/20</a:t>
+              <a:t>9/9/21</a:t>
             </a:fld>
             <a:endParaRPr lang="en-US"/>
           </a:p>
@@ -1067,7 +1067,7 @@
           <a:p>
             <a:fld id="{04F1D4A2-813C-F741-B481-C92B3A596030}" type="datetimeFigureOut">
               <a:rPr lang="en-US" smtClean="0"/>
-              <a:t>8/6/20</a:t>
+              <a:t>9/9/21</a:t>
             </a:fld>
             <a:endParaRPr lang="en-US"/>
           </a:p>
@@ -1246,7 +1246,7 @@
           <a:p>
             <a:fld id="{04F1D4A2-813C-F741-B481-C92B3A596030}" type="datetimeFigureOut">
               <a:rPr lang="en-US" smtClean="0"/>
-              <a:t>8/6/20</a:t>
+              <a:t>9/9/21</a:t>
             </a:fld>
             <a:endParaRPr lang="en-US"/>
           </a:p>
@@ -1491,7 +1491,7 @@
           <a:p>
             <a:fld id="{04F1D4A2-813C-F741-B481-C92B3A596030}" type="datetimeFigureOut">
               <a:rPr lang="en-US" smtClean="0"/>
-              <a:t>8/6/20</a:t>
+              <a:t>9/9/21</a:t>
             </a:fld>
             <a:endParaRPr lang="en-US"/>
           </a:p>
@@ -1720,7 +1720,7 @@
           <a:p>
             <a:fld id="{04F1D4A2-813C-F741-B481-C92B3A596030}" type="datetimeFigureOut">
               <a:rPr lang="en-US" smtClean="0"/>
-              <a:t>8/6/20</a:t>
+              <a:t>9/9/21</a:t>
             </a:fld>
             <a:endParaRPr lang="en-US"/>
           </a:p>
@@ -2084,7 +2084,7 @@
           <a:p>
             <a:fld id="{04F1D4A2-813C-F741-B481-C92B3A596030}" type="datetimeFigureOut">
               <a:rPr lang="en-US" smtClean="0"/>
-              <a:t>8/6/20</a:t>
+              <a:t>9/9/21</a:t>
             </a:fld>
             <a:endParaRPr lang="en-US"/>
           </a:p>
@@ -2201,7 +2201,7 @@
           <a:p>
             <a:fld id="{04F1D4A2-813C-F741-B481-C92B3A596030}" type="datetimeFigureOut">
               <a:rPr lang="en-US" smtClean="0"/>
-              <a:t>8/6/20</a:t>
+              <a:t>9/9/21</a:t>
             </a:fld>
             <a:endParaRPr lang="en-US"/>
           </a:p>
@@ -2296,7 +2296,7 @@
           <a:p>
             <a:fld id="{04F1D4A2-813C-F741-B481-C92B3A596030}" type="datetimeFigureOut">
               <a:rPr lang="en-US" smtClean="0"/>
-              <a:t>8/6/20</a:t>
+              <a:t>9/9/21</a:t>
             </a:fld>
             <a:endParaRPr lang="en-US"/>
           </a:p>
@@ -2571,7 +2571,7 @@
           <a:p>
             <a:fld id="{04F1D4A2-813C-F741-B481-C92B3A596030}" type="datetimeFigureOut">
               <a:rPr lang="en-US" smtClean="0"/>
-              <a:t>8/6/20</a:t>
+              <a:t>9/9/21</a:t>
             </a:fld>
             <a:endParaRPr lang="en-US"/>
           </a:p>
@@ -2823,7 +2823,7 @@
           <a:p>
             <a:fld id="{04F1D4A2-813C-F741-B481-C92B3A596030}" type="datetimeFigureOut">
               <a:rPr lang="en-US" smtClean="0"/>
-              <a:t>8/6/20</a:t>
+              <a:t>9/9/21</a:t>
             </a:fld>
             <a:endParaRPr lang="en-US"/>
           </a:p>
@@ -3034,7 +3034,7 @@
           <a:p>
             <a:fld id="{04F1D4A2-813C-F741-B481-C92B3A596030}" type="datetimeFigureOut">
               <a:rPr lang="en-US" smtClean="0"/>
-              <a:t>8/6/20</a:t>
+              <a:t>9/9/21</a:t>
             </a:fld>
             <a:endParaRPr lang="en-US"/>
           </a:p>
@@ -3464,15 +3464,7 @@
             <a:pPr algn="l"/>
             <a:r>
               <a:rPr lang="en-US" dirty="0"/>
-              <a:t>Enterprise </a:t>
-            </a:r>
-            <a:r>
-              <a:rPr lang="en-US" dirty="0" err="1"/>
-              <a:t>Programmering</a:t>
-            </a:r>
-            <a:r>
-              <a:rPr lang="en-US" dirty="0"/>
-              <a:t> 2</a:t>
+              <a:t>Enterprise Programming 2</a:t>
             </a:r>
             <a:br>
               <a:rPr lang="en-US" dirty="0"/>
@@ -3512,11 +3504,11 @@
             <a:pPr algn="r"/>
             <a:r>
               <a:rPr lang="en-US" dirty="0"/>
-              <a:t>Prof. Andrea </a:t>
+              <a:t>Bogdan </a:t>
             </a:r>
             <a:r>
               <a:rPr lang="en-US" dirty="0" err="1"/>
-              <a:t>Arcuri</a:t>
+              <a:t>Marculescu</a:t>
             </a:r>
             <a:endParaRPr lang="en-US" dirty="0"/>
           </a:p>

</xml_diff>